<commit_message>
Added hypothesis tests to presentation and report
</commit_message>
<xml_diff>
--- a/Project1_Presentation.pptx
+++ b/Project1_Presentation.pptx
@@ -20,8 +20,9 @@
     <p:sldId id="268" r:id="rId14"/>
     <p:sldId id="269" r:id="rId15"/>
     <p:sldId id="270" r:id="rId16"/>
-    <p:sldId id="271" r:id="rId17"/>
-    <p:sldId id="272" r:id="rId18"/>
+    <p:sldId id="273" r:id="rId17"/>
+    <p:sldId id="271" r:id="rId18"/>
+    <p:sldId id="272" r:id="rId19"/>
   </p:sldIdLst>
   <p:sldSz cx="12192000" cy="6858000"/>
   <p:notesSz cx="6858000" cy="9144000"/>
@@ -120,6 +121,11 @@
       </a:defRPr>
     </a:lvl9pPr>
   </p:defaultTextStyle>
+  <p:extLst>
+    <p:ext uri="{EFAFB233-063F-42B5-8137-9DF3F51BA10A}">
+      <p15:sldGuideLst xmlns:p15="http://schemas.microsoft.com/office/powerpoint/2012/main"/>
+    </p:ext>
+  </p:extLst>
 </p:presentation>
 </file>
 
@@ -254,7 +260,7 @@
           <a:p>
             <a:fld id="{DEDA7BC6-E763-374C-BBAD-592C91C60BD8}" type="datetimeFigureOut">
               <a:rPr lang="en-US" smtClean="0"/>
-              <a:t>2/13/23</a:t>
+              <a:t>2/14/23</a:t>
             </a:fld>
             <a:endParaRPr lang="en-US"/>
           </a:p>
@@ -424,7 +430,7 @@
           <a:p>
             <a:fld id="{DEDA7BC6-E763-374C-BBAD-592C91C60BD8}" type="datetimeFigureOut">
               <a:rPr lang="en-US" smtClean="0"/>
-              <a:t>2/13/23</a:t>
+              <a:t>2/14/23</a:t>
             </a:fld>
             <a:endParaRPr lang="en-US"/>
           </a:p>
@@ -604,7 +610,7 @@
           <a:p>
             <a:fld id="{DEDA7BC6-E763-374C-BBAD-592C91C60BD8}" type="datetimeFigureOut">
               <a:rPr lang="en-US" smtClean="0"/>
-              <a:t>2/13/23</a:t>
+              <a:t>2/14/23</a:t>
             </a:fld>
             <a:endParaRPr lang="en-US"/>
           </a:p>
@@ -774,7 +780,7 @@
           <a:p>
             <a:fld id="{DEDA7BC6-E763-374C-BBAD-592C91C60BD8}" type="datetimeFigureOut">
               <a:rPr lang="en-US" smtClean="0"/>
-              <a:t>2/13/23</a:t>
+              <a:t>2/14/23</a:t>
             </a:fld>
             <a:endParaRPr lang="en-US"/>
           </a:p>
@@ -1020,7 +1026,7 @@
           <a:p>
             <a:fld id="{DEDA7BC6-E763-374C-BBAD-592C91C60BD8}" type="datetimeFigureOut">
               <a:rPr lang="en-US" smtClean="0"/>
-              <a:t>2/13/23</a:t>
+              <a:t>2/14/23</a:t>
             </a:fld>
             <a:endParaRPr lang="en-US"/>
           </a:p>
@@ -1252,7 +1258,7 @@
           <a:p>
             <a:fld id="{DEDA7BC6-E763-374C-BBAD-592C91C60BD8}" type="datetimeFigureOut">
               <a:rPr lang="en-US" smtClean="0"/>
-              <a:t>2/13/23</a:t>
+              <a:t>2/14/23</a:t>
             </a:fld>
             <a:endParaRPr lang="en-US"/>
           </a:p>
@@ -1619,7 +1625,7 @@
           <a:p>
             <a:fld id="{DEDA7BC6-E763-374C-BBAD-592C91C60BD8}" type="datetimeFigureOut">
               <a:rPr lang="en-US" smtClean="0"/>
-              <a:t>2/13/23</a:t>
+              <a:t>2/14/23</a:t>
             </a:fld>
             <a:endParaRPr lang="en-US"/>
           </a:p>
@@ -1737,7 +1743,7 @@
           <a:p>
             <a:fld id="{DEDA7BC6-E763-374C-BBAD-592C91C60BD8}" type="datetimeFigureOut">
               <a:rPr lang="en-US" smtClean="0"/>
-              <a:t>2/13/23</a:t>
+              <a:t>2/14/23</a:t>
             </a:fld>
             <a:endParaRPr lang="en-US"/>
           </a:p>
@@ -1832,7 +1838,7 @@
           <a:p>
             <a:fld id="{DEDA7BC6-E763-374C-BBAD-592C91C60BD8}" type="datetimeFigureOut">
               <a:rPr lang="en-US" smtClean="0"/>
-              <a:t>2/13/23</a:t>
+              <a:t>2/14/23</a:t>
             </a:fld>
             <a:endParaRPr lang="en-US"/>
           </a:p>
@@ -2109,7 +2115,7 @@
           <a:p>
             <a:fld id="{DEDA7BC6-E763-374C-BBAD-592C91C60BD8}" type="datetimeFigureOut">
               <a:rPr lang="en-US" smtClean="0"/>
-              <a:t>2/13/23</a:t>
+              <a:t>2/14/23</a:t>
             </a:fld>
             <a:endParaRPr lang="en-US"/>
           </a:p>
@@ -2366,7 +2372,7 @@
           <a:p>
             <a:fld id="{DEDA7BC6-E763-374C-BBAD-592C91C60BD8}" type="datetimeFigureOut">
               <a:rPr lang="en-US" smtClean="0"/>
-              <a:t>2/13/23</a:t>
+              <a:t>2/14/23</a:t>
             </a:fld>
             <a:endParaRPr lang="en-US"/>
           </a:p>
@@ -2579,7 +2585,7 @@
           <a:p>
             <a:fld id="{DEDA7BC6-E763-374C-BBAD-592C91C60BD8}" type="datetimeFigureOut">
               <a:rPr lang="en-US" smtClean="0"/>
-              <a:t>2/13/23</a:t>
+              <a:t>2/14/23</a:t>
             </a:fld>
             <a:endParaRPr lang="en-US"/>
           </a:p>
@@ -3733,7 +3739,7 @@
           <a:p>
             <a:r>
               <a:rPr lang="en-CA" dirty="0"/>
-              <a:t>The the median of new cases per million is: 3083.772</a:t>
+              <a:t>The median of new cases per million is: 3083.772</a:t>
             </a:r>
           </a:p>
           <a:p>
@@ -3853,6 +3859,259 @@
           <p:cNvPr id="2" name="Title 1">
             <a:extLst>
               <a:ext uri="{FF2B5EF4-FFF2-40B4-BE49-F238E27FC236}">
+                <a16:creationId xmlns:a16="http://schemas.microsoft.com/office/drawing/2014/main" id="{8C2B1800-F477-2176-9D87-1618E5BAD526}"/>
+              </a:ext>
+            </a:extLst>
+          </p:cNvPr>
+          <p:cNvSpPr>
+            <a:spLocks noGrp="1"/>
+          </p:cNvSpPr>
+          <p:nvPr>
+            <p:ph type="title"/>
+          </p:nvPr>
+        </p:nvSpPr>
+        <p:spPr/>
+        <p:txBody>
+          <a:bodyPr/>
+          <a:lstStyle/>
+          <a:p>
+            <a:r>
+              <a:rPr lang="en-US" dirty="0"/>
+              <a:t>Hypothesis Testing</a:t>
+            </a:r>
+          </a:p>
+        </p:txBody>
+      </p:sp>
+      <p:sp>
+        <p:nvSpPr>
+          <p:cNvPr id="3" name="Content Placeholder 2">
+            <a:extLst>
+              <a:ext uri="{FF2B5EF4-FFF2-40B4-BE49-F238E27FC236}">
+                <a16:creationId xmlns:a16="http://schemas.microsoft.com/office/drawing/2014/main" id="{EDE67241-93D2-2FE9-3FA1-17528660AA9E}"/>
+              </a:ext>
+            </a:extLst>
+          </p:cNvPr>
+          <p:cNvSpPr>
+            <a:spLocks noGrp="1"/>
+          </p:cNvSpPr>
+          <p:nvPr>
+            <p:ph idx="1"/>
+          </p:nvPr>
+        </p:nvSpPr>
+        <p:spPr/>
+        <p:txBody>
+          <a:bodyPr>
+            <a:normAutofit fontScale="47500" lnSpcReduction="20000"/>
+          </a:bodyPr>
+          <a:lstStyle/>
+          <a:p>
+            <a:pPr marL="342900" lvl="0" indent="-342900">
+              <a:lnSpc>
+                <a:spcPct val="107000"/>
+              </a:lnSpc>
+              <a:spcAft>
+                <a:spcPts val="800"/>
+              </a:spcAft>
+              <a:buSzPts val="1000"/>
+              <a:buFont typeface="Symbol" pitchFamily="2" charset="2"/>
+              <a:buChar char=""/>
+              <a:tabLst>
+                <a:tab pos="457200" algn="l"/>
+              </a:tabLst>
+            </a:pPr>
+            <a:r>
+              <a:rPr lang="en-CA" sz="6000" dirty="0">
+                <a:latin typeface="Calibri" panose="020F0502020204030204" pitchFamily="34" charset="0"/>
+                <a:cs typeface="Times New Roman" panose="02020603050405020304" pitchFamily="18" charset="0"/>
+              </a:rPr>
+              <a:t>Does having a higher GDP impacted the number of deaths?</a:t>
+            </a:r>
+          </a:p>
+          <a:p>
+            <a:pPr marL="0" lvl="0" indent="0">
+              <a:lnSpc>
+                <a:spcPct val="120000"/>
+              </a:lnSpc>
+              <a:spcBef>
+                <a:spcPts val="0"/>
+              </a:spcBef>
+              <a:buSzPts val="1000"/>
+              <a:buNone/>
+              <a:tabLst>
+                <a:tab pos="457200" algn="l"/>
+              </a:tabLst>
+            </a:pPr>
+            <a:r>
+              <a:rPr lang="en-CA" sz="4300" dirty="0">
+                <a:latin typeface="Calibri" panose="020F0502020204030204" pitchFamily="34" charset="0"/>
+                <a:cs typeface="Times New Roman" panose="02020603050405020304" pitchFamily="18" charset="0"/>
+              </a:rPr>
+              <a:t>Using the sum of new deaths on top and bottom GDP countries, with </a:t>
+            </a:r>
+          </a:p>
+          <a:p>
+            <a:pPr marL="0" lvl="0" indent="0">
+              <a:lnSpc>
+                <a:spcPct val="120000"/>
+              </a:lnSpc>
+              <a:spcBef>
+                <a:spcPts val="0"/>
+              </a:spcBef>
+              <a:buSzPts val="1000"/>
+              <a:buNone/>
+              <a:tabLst>
+                <a:tab pos="457200" algn="l"/>
+              </a:tabLst>
+            </a:pPr>
+            <a:r>
+              <a:rPr lang="en-CA" sz="4300" dirty="0">
+                <a:latin typeface="Calibri" panose="020F0502020204030204" pitchFamily="34" charset="0"/>
+                <a:cs typeface="Times New Roman" panose="02020603050405020304" pitchFamily="18" charset="0"/>
+              </a:rPr>
+              <a:t>PVALUE: 0.004785686708112386, it is confirmed the </a:t>
+            </a:r>
+            <a:r>
+              <a:rPr lang="en-CA" sz="4300" b="1" dirty="0">
+                <a:latin typeface="Calibri" panose="020F0502020204030204" pitchFamily="34" charset="0"/>
+                <a:cs typeface="Times New Roman" panose="02020603050405020304" pitchFamily="18" charset="0"/>
+              </a:rPr>
+              <a:t>Alternate Hypothesis</a:t>
+            </a:r>
+            <a:r>
+              <a:rPr lang="en-CA" sz="4300" dirty="0">
+                <a:latin typeface="Calibri" panose="020F0502020204030204" pitchFamily="34" charset="0"/>
+                <a:cs typeface="Times New Roman" panose="02020603050405020304" pitchFamily="18" charset="0"/>
+              </a:rPr>
+              <a:t> that the GDP of a country has an impact on the number of Covid deaths.</a:t>
+            </a:r>
+          </a:p>
+          <a:p>
+            <a:pPr marL="342900" lvl="0" indent="-342900">
+              <a:lnSpc>
+                <a:spcPct val="107000"/>
+              </a:lnSpc>
+              <a:spcAft>
+                <a:spcPts val="800"/>
+              </a:spcAft>
+              <a:buSzPts val="1000"/>
+              <a:buFont typeface="Symbol" pitchFamily="2" charset="2"/>
+              <a:buChar char=""/>
+              <a:tabLst>
+                <a:tab pos="457200" algn="l"/>
+              </a:tabLst>
+            </a:pPr>
+            <a:r>
+              <a:rPr lang="en-CA" sz="6200" dirty="0">
+                <a:latin typeface="Calibri" panose="020F0502020204030204" pitchFamily="34" charset="0"/>
+                <a:cs typeface="Times New Roman" panose="02020603050405020304" pitchFamily="18" charset="0"/>
+              </a:rPr>
+              <a:t>Does having a higher Stringency Index impacted the number of cases?</a:t>
+            </a:r>
+          </a:p>
+          <a:p>
+            <a:pPr marL="0" indent="0">
+              <a:lnSpc>
+                <a:spcPct val="120000"/>
+              </a:lnSpc>
+              <a:spcBef>
+                <a:spcPts val="0"/>
+              </a:spcBef>
+              <a:spcAft>
+                <a:spcPts val="800"/>
+              </a:spcAft>
+              <a:buSzPts val="1000"/>
+              <a:buNone/>
+              <a:tabLst>
+                <a:tab pos="457200" algn="l"/>
+              </a:tabLst>
+            </a:pPr>
+            <a:r>
+              <a:rPr lang="en-CA" sz="4200" dirty="0">
+                <a:latin typeface="Calibri" panose="020F0502020204030204" pitchFamily="34" charset="0"/>
+                <a:cs typeface="Times New Roman" panose="02020603050405020304" pitchFamily="18" charset="0"/>
+              </a:rPr>
+              <a:t>Using the Stringency Index of two countries in the sample group, with </a:t>
+            </a:r>
+          </a:p>
+          <a:p>
+            <a:pPr marL="0" indent="0">
+              <a:lnSpc>
+                <a:spcPct val="120000"/>
+              </a:lnSpc>
+              <a:spcBef>
+                <a:spcPts val="0"/>
+              </a:spcBef>
+              <a:spcAft>
+                <a:spcPts val="800"/>
+              </a:spcAft>
+              <a:buSzPts val="1000"/>
+              <a:buNone/>
+              <a:tabLst>
+                <a:tab pos="457200" algn="l"/>
+              </a:tabLst>
+            </a:pPr>
+            <a:r>
+              <a:rPr lang="en-CA" sz="4200" dirty="0">
+                <a:latin typeface="Calibri" panose="020F0502020204030204" pitchFamily="34" charset="0"/>
+                <a:cs typeface="Times New Roman" panose="02020603050405020304" pitchFamily="18" charset="0"/>
+              </a:rPr>
+              <a:t>PVALUE: 0.00010234781408566989, it is confirmed the </a:t>
+            </a:r>
+            <a:r>
+              <a:rPr lang="en-CA" sz="4200" b="1" dirty="0">
+                <a:latin typeface="Calibri" panose="020F0502020204030204" pitchFamily="34" charset="0"/>
+                <a:cs typeface="Times New Roman" panose="02020603050405020304" pitchFamily="18" charset="0"/>
+              </a:rPr>
+              <a:t>Null Hypothesis</a:t>
+            </a:r>
+            <a:r>
+              <a:rPr lang="en-CA" sz="4200" dirty="0">
+                <a:latin typeface="Calibri" panose="020F0502020204030204" pitchFamily="34" charset="0"/>
+                <a:cs typeface="Times New Roman" panose="02020603050405020304" pitchFamily="18" charset="0"/>
+              </a:rPr>
+              <a:t> - The Stringency Index of a country has no impact the number of Covid cases.</a:t>
+            </a:r>
+          </a:p>
+          <a:p>
+            <a:endParaRPr lang="en-US" dirty="0"/>
+          </a:p>
+        </p:txBody>
+      </p:sp>
+    </p:spTree>
+    <p:extLst>
+      <p:ext uri="{BB962C8B-B14F-4D97-AF65-F5344CB8AC3E}">
+        <p14:creationId xmlns:p14="http://schemas.microsoft.com/office/powerpoint/2010/main" val="3056929547"/>
+      </p:ext>
+    </p:extLst>
+  </p:cSld>
+  <p:clrMapOvr>
+    <a:masterClrMapping/>
+  </p:clrMapOvr>
+</p:sld>
+</file>
+
+<file path=ppt/slides/slide17.xml><?xml version="1.0" encoding="utf-8"?>
+<p:sld xmlns:a="http://schemas.openxmlformats.org/drawingml/2006/main" xmlns:r="http://schemas.openxmlformats.org/officeDocument/2006/relationships" xmlns:p="http://schemas.openxmlformats.org/presentationml/2006/main">
+  <p:cSld>
+    <p:spTree>
+      <p:nvGrpSpPr>
+        <p:cNvPr id="1" name=""/>
+        <p:cNvGrpSpPr/>
+        <p:nvPr/>
+      </p:nvGrpSpPr>
+      <p:grpSpPr>
+        <a:xfrm>
+          <a:off x="0" y="0"/>
+          <a:ext cx="0" cy="0"/>
+          <a:chOff x="0" y="0"/>
+          <a:chExt cx="0" cy="0"/>
+        </a:xfrm>
+      </p:grpSpPr>
+      <p:sp>
+        <p:nvSpPr>
+          <p:cNvPr id="2" name="Title 1">
+            <a:extLst>
+              <a:ext uri="{FF2B5EF4-FFF2-40B4-BE49-F238E27FC236}">
                 <a16:creationId xmlns:a16="http://schemas.microsoft.com/office/drawing/2014/main" id="{BEF86E82-28DC-7089-B748-33C0B99C7691}"/>
               </a:ext>
             </a:extLst>
@@ -4107,7 +4366,7 @@
 </p:sld>
 </file>
 
-<file path=ppt/slides/slide17.xml><?xml version="1.0" encoding="utf-8"?>
+<file path=ppt/slides/slide18.xml><?xml version="1.0" encoding="utf-8"?>
 <p:sld xmlns:a="http://schemas.openxmlformats.org/drawingml/2006/main" xmlns:r="http://schemas.openxmlformats.org/officeDocument/2006/relationships" xmlns:p="http://schemas.openxmlformats.org/presentationml/2006/main">
   <p:cSld>
     <p:spTree>

</xml_diff>